<commit_message>
Slides CLOUD 2014 with speech
</commit_message>
<xml_diff>
--- a/Journee-ARC6/cloud-benani-vargas-ghedira-musicante.pptx
+++ b/Journee-ARC6/cloud-benani-vargas-ghedira-musicante.pptx
@@ -124,7 +124,7 @@
   </p:defaultTextStyle>
   <p:extLst>
     <p:ext uri="{EFAFB233-063F-42B5-8137-9DF3F51BA10A}">
-      <p15:sldGuideLst xmlns:p15="http://schemas.microsoft.com/office/powerpoint/2012/main" xmlns="">
+      <p15:sldGuideLst xmlns="" xmlns:p15="http://schemas.microsoft.com/office/powerpoint/2012/main">
         <p15:guide id="1" orient="horz" pos="1620">
           <p15:clr>
             <a:srgbClr val="A4A3A4"/>
@@ -223,7 +223,7 @@
           <a:p>
             <a:fld id="{A77E57C5-5813-5747-A65D-14904BC3B28A}" type="datetimeFigureOut">
               <a:rPr lang="fr-FR" smtClean="0"/>
-              <a:t>13/06/2014</a:t>
+              <a:t>15/06/2014</a:t>
             </a:fld>
             <a:endParaRPr lang="es-ES_tradnl"/>
           </a:p>
@@ -389,7 +389,7 @@
           <a:p>
             <a:fld id="{80840C0A-9A0E-6F48-97E1-1968C32D5906}" type="datetimeFigureOut">
               <a:rPr lang="fr-FR" smtClean="0"/>
-              <a:t>13/06/2014</a:t>
+              <a:t>15/06/2014</a:t>
             </a:fld>
             <a:endParaRPr lang="es-ES_tradnl"/>
           </a:p>
@@ -800,6 +800,55 @@
           <a:bodyPr/>
           <a:lstStyle/>
           <a:p>
+            <a:r>
+              <a:rPr lang="en-GB" dirty="0" smtClean="0"/>
+              <a:t>In order to integrate SLAs</a:t>
+            </a:r>
+            <a:r>
+              <a:rPr lang="en-GB" baseline="0" dirty="0" smtClean="0"/>
+              <a:t> from services and cloud providers with user preferences we extend the following SLA model:</a:t>
+            </a:r>
+          </a:p>
+          <a:p>
+            <a:r>
+              <a:rPr lang="en-GB" baseline="0" dirty="0" smtClean="0"/>
+              <a:t>That represents SLA as a concept consisting of Obligations, Parameters established among Parties (shown in white boxes) </a:t>
+            </a:r>
+          </a:p>
+          <a:p>
+            <a:r>
+              <a:rPr lang="en-GB" baseline="0" dirty="0" smtClean="0"/>
+              <a:t>We model particularly SLA established between a User and a Cloud provider, and the SLA that a cloud provider associates to a given Service (violet boxes)</a:t>
+            </a:r>
+          </a:p>
+          <a:p>
+            <a:r>
+              <a:rPr lang="en-GB" baseline="0" dirty="0" smtClean="0"/>
+              <a:t>An Integrated is associated to the Concepts of a Query that is implemented by a Service composition (yellow boxes)</a:t>
+            </a:r>
+          </a:p>
+          <a:p>
+            <a:r>
+              <a:rPr lang="en-GB" baseline="0" dirty="0" smtClean="0"/>
+              <a:t>The integrated SLA has Negotiation Rules (pink box) that express Guaranties that the services implicated in the Query have to honour. </a:t>
+            </a:r>
+          </a:p>
+          <a:p>
+            <a:endParaRPr lang="en-GB" baseline="0" dirty="0" smtClean="0"/>
+          </a:p>
+          <a:p>
+            <a:r>
+              <a:rPr lang="en-GB" baseline="0" dirty="0" smtClean="0"/>
+              <a:t>To illustrate the use of the model here an example:</a:t>
+            </a:r>
+          </a:p>
+          <a:p>
+            <a:endParaRPr lang="en-GB" baseline="0" dirty="0" smtClean="0"/>
+          </a:p>
+          <a:p>
+            <a:endParaRPr lang="en-GB" baseline="0" dirty="0" smtClean="0"/>
+          </a:p>
+          <a:p>
             <a:endParaRPr lang="en-GB" dirty="0"/>
           </a:p>
         </p:txBody>
@@ -821,6 +870,125 @@
           <a:p>
             <a:fld id="{57E0BC2A-8237-8C45-84CA-A7F136E6A562}" type="slidenum">
               <a:rPr lang="es-ES_tradnl" smtClean="0"/>
+              <a:t>10</a:t>
+            </a:fld>
+            <a:endParaRPr lang="es-ES_tradnl"/>
+          </a:p>
+        </p:txBody>
+      </p:sp>
+    </p:spTree>
+    <p:extLst>
+      <p:ext uri="{BB962C8B-B14F-4D97-AF65-F5344CB8AC3E}">
+        <p14:creationId xmlns:p14="http://schemas.microsoft.com/office/powerpoint/2010/main" val="2633287569"/>
+      </p:ext>
+    </p:extLst>
+  </p:cSld>
+  <p:clrMapOvr>
+    <a:masterClrMapping/>
+  </p:clrMapOvr>
+</p:notes>
+</file>
+
+<file path=ppt/notesSlides/notesSlide11.xml><?xml version="1.0" encoding="utf-8"?>
+<p:notes xmlns:a="http://schemas.openxmlformats.org/drawingml/2006/main" xmlns:r="http://schemas.openxmlformats.org/officeDocument/2006/relationships" xmlns:p="http://schemas.openxmlformats.org/presentationml/2006/main">
+  <p:cSld>
+    <p:spTree>
+      <p:nvGrpSpPr>
+        <p:cNvPr id="1" name=""/>
+        <p:cNvGrpSpPr/>
+        <p:nvPr/>
+      </p:nvGrpSpPr>
+      <p:grpSpPr>
+        <a:xfrm>
+          <a:off x="0" y="0"/>
+          <a:ext cx="0" cy="0"/>
+          <a:chOff x="0" y="0"/>
+          <a:chExt cx="0" cy="0"/>
+        </a:xfrm>
+      </p:grpSpPr>
+      <p:sp>
+        <p:nvSpPr>
+          <p:cNvPr id="2" name="Espace réservé de l'image des diapositives 1"/>
+          <p:cNvSpPr>
+            <a:spLocks noGrp="1" noRot="1" noChangeAspect="1"/>
+          </p:cNvSpPr>
+          <p:nvPr>
+            <p:ph type="sldImg"/>
+          </p:nvPr>
+        </p:nvSpPr>
+        <p:spPr/>
+      </p:sp>
+      <p:sp>
+        <p:nvSpPr>
+          <p:cNvPr id="3" name="Espace réservé des commentaires 2"/>
+          <p:cNvSpPr>
+            <a:spLocks noGrp="1"/>
+          </p:cNvSpPr>
+          <p:nvPr>
+            <p:ph type="body" idx="1"/>
+          </p:nvPr>
+        </p:nvSpPr>
+        <p:spPr/>
+        <p:txBody>
+          <a:bodyPr/>
+          <a:lstStyle/>
+          <a:p>
+            <a:r>
+              <a:rPr lang="en-GB" dirty="0" smtClean="0"/>
+              <a:t>We model the SLA established</a:t>
+            </a:r>
+            <a:r>
+              <a:rPr lang="en-GB" baseline="0" dirty="0" smtClean="0"/>
+              <a:t> for instance through the most simple subscription to Azure with a cost of O,O5 dollar cents per call, 8 Gb of I/O per month, free data transfer cost within the same regions, and 1 GB storage space.</a:t>
+            </a:r>
+          </a:p>
+          <a:p>
+            <a:endParaRPr lang="en-GB" baseline="0" dirty="0" smtClean="0"/>
+          </a:p>
+          <a:p>
+            <a:r>
+              <a:rPr lang="en-GB" baseline="0" dirty="0" smtClean="0"/>
+              <a:t>On the other hand we have the user preferences for the query we propose in our example. She can pay at most 5 USD as the total query cost, she only want green energy providers involved in the results, with 85% of precision of the data in with a total response of 0,01 seconds. </a:t>
+            </a:r>
+          </a:p>
+          <a:p>
+            <a:endParaRPr lang="en-GB" baseline="0" dirty="0" smtClean="0"/>
+          </a:p>
+          <a:p>
+            <a:r>
+              <a:rPr lang="en-GB" baseline="0" dirty="0" smtClean="0"/>
+              <a:t>Finally the integrated SLA couples both statements and leads to a set of constraints that have to do </a:t>
+            </a:r>
+          </a:p>
+          <a:p>
+            <a:pPr marL="171450" indent="-171450">
+              <a:buFontTx/>
+              <a:buChar char="-"/>
+            </a:pPr>
+            <a:r>
+              <a:rPr lang="en-GB" baseline="0" dirty="0" smtClean="0"/>
+              <a:t>With the total query cost, the response time, the availability of services, the freshness of data, the precision and provenance of services and the size of  partial results that can be stored</a:t>
+            </a:r>
+          </a:p>
+        </p:txBody>
+      </p:sp>
+      <p:sp>
+        <p:nvSpPr>
+          <p:cNvPr id="4" name="Espace réservé du numéro de diapositive 3"/>
+          <p:cNvSpPr>
+            <a:spLocks noGrp="1"/>
+          </p:cNvSpPr>
+          <p:nvPr>
+            <p:ph type="sldNum" sz="quarter" idx="10"/>
+          </p:nvPr>
+        </p:nvSpPr>
+        <p:spPr/>
+        <p:txBody>
+          <a:bodyPr/>
+          <a:lstStyle/>
+          <a:p>
+            <a:fld id="{57E0BC2A-8237-8C45-84CA-A7F136E6A562}" type="slidenum">
+              <a:rPr lang="es-ES_tradnl" smtClean="0"/>
               <a:t>11</a:t>
             </a:fld>
             <a:endParaRPr lang="es-ES_tradnl"/>
@@ -840,7 +1008,150 @@
 </p:notes>
 </file>
 
-<file path=ppt/notesSlides/notesSlide11.xml><?xml version="1.0" encoding="utf-8"?>
+<file path=ppt/notesSlides/notesSlide12.xml><?xml version="1.0" encoding="utf-8"?>
+<p:notes xmlns:a="http://schemas.openxmlformats.org/drawingml/2006/main" xmlns:r="http://schemas.openxmlformats.org/officeDocument/2006/relationships" xmlns:p="http://schemas.openxmlformats.org/presentationml/2006/main">
+  <p:cSld>
+    <p:spTree>
+      <p:nvGrpSpPr>
+        <p:cNvPr id="1" name=""/>
+        <p:cNvGrpSpPr/>
+        <p:nvPr/>
+      </p:nvGrpSpPr>
+      <p:grpSpPr>
+        <a:xfrm>
+          <a:off x="0" y="0"/>
+          <a:ext cx="0" cy="0"/>
+          <a:chOff x="0" y="0"/>
+          <a:chExt cx="0" cy="0"/>
+        </a:xfrm>
+      </p:grpSpPr>
+      <p:sp>
+        <p:nvSpPr>
+          <p:cNvPr id="2" name="Espace réservé de l'image des diapositives 1"/>
+          <p:cNvSpPr>
+            <a:spLocks noGrp="1" noRot="1" noChangeAspect="1"/>
+          </p:cNvSpPr>
+          <p:nvPr>
+            <p:ph type="sldImg"/>
+          </p:nvPr>
+        </p:nvSpPr>
+        <p:spPr/>
+      </p:sp>
+      <p:sp>
+        <p:nvSpPr>
+          <p:cNvPr id="3" name="Espace réservé des commentaires 2"/>
+          <p:cNvSpPr>
+            <a:spLocks noGrp="1"/>
+          </p:cNvSpPr>
+          <p:nvPr>
+            <p:ph type="body" idx="1"/>
+          </p:nvPr>
+        </p:nvSpPr>
+        <p:spPr/>
+        <p:txBody>
+          <a:bodyPr/>
+          <a:lstStyle/>
+          <a:p>
+            <a:r>
+              <a:rPr lang="en-GB" dirty="0" smtClean="0"/>
+              <a:t>In order to conclude:</a:t>
+            </a:r>
+          </a:p>
+          <a:p>
+            <a:pPr marL="171450" indent="-171450">
+              <a:buFontTx/>
+              <a:buChar char="-"/>
+            </a:pPr>
+            <a:r>
+              <a:rPr lang="en-GB" dirty="0" smtClean="0"/>
+              <a:t>We believe</a:t>
+            </a:r>
+            <a:r>
+              <a:rPr lang="en-GB" baseline="0" dirty="0" smtClean="0"/>
+              <a:t> that current big data settings impose to consider SLA and different data delivery models</a:t>
+            </a:r>
+          </a:p>
+          <a:p>
+            <a:pPr marL="171450" indent="-171450">
+              <a:buFontTx/>
+              <a:buChar char="-"/>
+            </a:pPr>
+            <a:r>
+              <a:rPr lang="en-GB" baseline="0" dirty="0" smtClean="0"/>
+              <a:t>In this context, the complexity of query evaluation includes steps that imply greedy computations that call to revisit well – known solutions in parallel and cloud distributed platforms</a:t>
+            </a:r>
+          </a:p>
+          <a:p>
+            <a:pPr marL="171450" indent="-171450">
+              <a:buFontTx/>
+              <a:buChar char="-"/>
+            </a:pPr>
+            <a:r>
+              <a:rPr lang="en-GB" baseline="0" dirty="0" smtClean="0"/>
+              <a:t>We aim at developing data integration strategies and algorithms guided by SLA constraints that can be then applied to energy consumption applications</a:t>
+            </a:r>
+          </a:p>
+          <a:p>
+            <a:pPr marL="0" indent="0">
+              <a:buFontTx/>
+              <a:buNone/>
+            </a:pPr>
+            <a:endParaRPr lang="en-GB" baseline="0" dirty="0" smtClean="0"/>
+          </a:p>
+          <a:p>
+            <a:pPr marL="0" indent="0">
+              <a:buFontTx/>
+              <a:buNone/>
+            </a:pPr>
+            <a:r>
+              <a:rPr lang="en-GB" baseline="0" dirty="0" smtClean="0"/>
+              <a:t>Our hints are= SLA modelling and integration as shown today, automatic learning for reduces overhead, defining business models for delivering </a:t>
+            </a:r>
+            <a:r>
+              <a:rPr lang="en-GB" baseline="0" smtClean="0"/>
+              <a:t>query results.</a:t>
+            </a:r>
+            <a:endParaRPr lang="en-GB" dirty="0" smtClean="0"/>
+          </a:p>
+        </p:txBody>
+      </p:sp>
+      <p:sp>
+        <p:nvSpPr>
+          <p:cNvPr id="4" name="Espace réservé du numéro de diapositive 3"/>
+          <p:cNvSpPr>
+            <a:spLocks noGrp="1"/>
+          </p:cNvSpPr>
+          <p:nvPr>
+            <p:ph type="sldNum" sz="quarter" idx="10"/>
+          </p:nvPr>
+        </p:nvSpPr>
+        <p:spPr/>
+        <p:txBody>
+          <a:bodyPr/>
+          <a:lstStyle/>
+          <a:p>
+            <a:fld id="{57E0BC2A-8237-8C45-84CA-A7F136E6A562}" type="slidenum">
+              <a:rPr lang="es-ES_tradnl" smtClean="0"/>
+              <a:t>12</a:t>
+            </a:fld>
+            <a:endParaRPr lang="es-ES_tradnl"/>
+          </a:p>
+        </p:txBody>
+      </p:sp>
+    </p:spTree>
+    <p:extLst>
+      <p:ext uri="{BB962C8B-B14F-4D97-AF65-F5344CB8AC3E}">
+        <p14:creationId xmlns:p14="http://schemas.microsoft.com/office/powerpoint/2010/main" val="3169255767"/>
+      </p:ext>
+    </p:extLst>
+  </p:cSld>
+  <p:clrMapOvr>
+    <a:masterClrMapping/>
+  </p:clrMapOvr>
+</p:notes>
+</file>
+
+<file path=ppt/notesSlides/notesSlide13.xml><?xml version="1.0" encoding="utf-8"?>
 <p:notes xmlns:a="http://schemas.openxmlformats.org/drawingml/2006/main" xmlns:r="http://schemas.openxmlformats.org/officeDocument/2006/relationships" xmlns:p="http://schemas.openxmlformats.org/presentationml/2006/main">
   <p:cSld>
     <p:spTree>
@@ -3278,7 +3589,7 @@
           <a:p>
             <a:fld id="{08173A4C-CE70-0842-955E-7836C9977CD0}" type="datetime1">
               <a:rPr lang="fr-FR" smtClean="0"/>
-              <a:t>13/06/2014</a:t>
+              <a:t>15/06/2014</a:t>
             </a:fld>
             <a:endParaRPr lang="en-GB"/>
           </a:p>
@@ -3540,7 +3851,7 @@
           <a:p>
             <a:fld id="{FFCC69C8-B675-1649-A9BD-41EBD27C87D2}" type="datetime1">
               <a:rPr lang="fr-FR" smtClean="0"/>
-              <a:t>13/06/2014</a:t>
+              <a:t>15/06/2014</a:t>
             </a:fld>
             <a:endParaRPr lang="en-GB"/>
           </a:p>
@@ -3775,7 +4086,7 @@
           <a:p>
             <a:fld id="{4BAE475C-31E1-764F-AEF6-3694F06675D0}" type="datetime1">
               <a:rPr lang="fr-FR" smtClean="0"/>
-              <a:t>13/06/2014</a:t>
+              <a:t>15/06/2014</a:t>
             </a:fld>
             <a:endParaRPr lang="en-GB"/>
           </a:p>
@@ -4240,7 +4551,7 @@
             </a:pPr>
             <a:fld id="{D302CF7C-A13E-A345-84DA-F5AB6E7DF0E9}" type="datetime1">
               <a:rPr lang="fr-FR" smtClean="0"/>
-              <a:t>13/06/2014</a:t>
+              <a:t>15/06/2014</a:t>
             </a:fld>
             <a:endParaRPr lang="en-GB"/>
           </a:p>
@@ -4457,7 +4768,7 @@
           <a:p>
             <a:fld id="{825AAD87-5DB6-FD45-9B91-4F6BC3D3F595}" type="datetime1">
               <a:rPr lang="fr-FR" smtClean="0"/>
-              <a:t>13/06/2014</a:t>
+              <a:t>15/06/2014</a:t>
             </a:fld>
             <a:endParaRPr lang="en-US"/>
           </a:p>
@@ -4835,7 +5146,7 @@
           <a:p>
             <a:fld id="{A730A38C-46F8-1741-9A21-08C25CCF77B8}" type="datetime1">
               <a:rPr lang="fr-FR" smtClean="0"/>
-              <a:t>13/06/2014</a:t>
+              <a:t>15/06/2014</a:t>
             </a:fld>
             <a:endParaRPr lang="en-US"/>
           </a:p>
@@ -5418,7 +5729,7 @@
           <a:p>
             <a:fld id="{07A11159-4733-984B-82E6-F506241142AC}" type="datetime1">
               <a:rPr lang="fr-FR" smtClean="0"/>
-              <a:t>13/06/2014</a:t>
+              <a:t>15/06/2014</a:t>
             </a:fld>
             <a:endParaRPr lang="en-US"/>
           </a:p>
@@ -5637,7 +5948,7 @@
           <a:p>
             <a:fld id="{EDA3E0B9-CC88-8645-9C27-FEB189175B0D}" type="datetime1">
               <a:rPr lang="fr-FR" smtClean="0"/>
-              <a:t>13/06/2014</a:t>
+              <a:t>15/06/2014</a:t>
             </a:fld>
             <a:endParaRPr lang="en-GB"/>
           </a:p>
@@ -5944,7 +6255,7 @@
           <a:p>
             <a:fld id="{7DE04ABD-EA59-D340-8A4B-D382B3BF6F0B}" type="datetime1">
               <a:rPr lang="fr-FR" smtClean="0"/>
-              <a:t>13/06/2014</a:t>
+              <a:t>15/06/2014</a:t>
             </a:fld>
             <a:endParaRPr lang="en-GB"/>
           </a:p>
@@ -6246,7 +6557,7 @@
           <a:p>
             <a:fld id="{D5501940-797B-154C-B283-2D29903CC2BA}" type="datetime1">
               <a:rPr lang="fr-FR" smtClean="0"/>
-              <a:t>13/06/2014</a:t>
+              <a:t>15/06/2014</a:t>
             </a:fld>
             <a:endParaRPr lang="en-GB"/>
           </a:p>
@@ -6668,7 +6979,7 @@
           <a:p>
             <a:fld id="{2D40B61E-7161-8349-B1B0-1706419BC512}" type="datetime1">
               <a:rPr lang="fr-FR" smtClean="0"/>
-              <a:t>13/06/2014</a:t>
+              <a:t>15/06/2014</a:t>
             </a:fld>
             <a:endParaRPr lang="en-GB"/>
           </a:p>
@@ -6830,7 +7141,7 @@
           <a:p>
             <a:fld id="{F1F996EE-AEA5-7247-84F6-5653F10EA78E}" type="datetime1">
               <a:rPr lang="fr-FR" smtClean="0"/>
-              <a:t>13/06/2014</a:t>
+              <a:t>15/06/2014</a:t>
             </a:fld>
             <a:endParaRPr lang="en-GB"/>
           </a:p>
@@ -6925,7 +7236,7 @@
           <a:p>
             <a:fld id="{970A5426-907C-B84D-976B-85288A8ADDB1}" type="datetime1">
               <a:rPr lang="fr-FR" smtClean="0"/>
-              <a:t>13/06/2014</a:t>
+              <a:t>15/06/2014</a:t>
             </a:fld>
             <a:endParaRPr lang="en-GB"/>
           </a:p>
@@ -7303,7 +7614,7 @@
           <a:p>
             <a:fld id="{7C8B3765-6DE2-FF46-A407-C716D7CC1B8C}" type="datetime1">
               <a:rPr lang="fr-FR" smtClean="0"/>
-              <a:t>13/06/2014</a:t>
+              <a:t>15/06/2014</a:t>
             </a:fld>
             <a:endParaRPr lang="en-GB"/>
           </a:p>
@@ -7592,7 +7903,7 @@
           <a:p>
             <a:fld id="{44F34D2A-E81D-7F49-85D1-AFDCEF49289D}" type="datetime1">
               <a:rPr lang="fr-FR" smtClean="0"/>
-              <a:t>13/06/2014</a:t>
+              <a:t>15/06/2014</a:t>
             </a:fld>
             <a:endParaRPr lang="en-GB"/>
           </a:p>
@@ -7803,7 +8114,7 @@
           <a:p>
             <a:fld id="{A4430339-9F7B-9E4D-B5EF-3BC3BAD6E4FA}" type="datetime1">
               <a:rPr lang="fr-FR" smtClean="0"/>
-              <a:t>13/06/2014</a:t>
+              <a:t>15/06/2014</a:t>
             </a:fld>
             <a:endParaRPr lang="en-GB"/>
           </a:p>
@@ -8476,11 +8787,7 @@
             </a:r>
             <a:r>
               <a:rPr lang="en-GB" sz="1700" cap="small" dirty="0" smtClean="0"/>
-              <a:t>, </a:t>
-            </a:r>
-            <a:r>
-              <a:rPr lang="en-GB" sz="1700" cap="small" dirty="0" smtClean="0"/>
-              <a:t>M. </a:t>
+              <a:t>, M. </a:t>
             </a:r>
             <a:r>
               <a:rPr lang="en-GB" sz="1700" cap="small" dirty="0" err="1" smtClean="0"/>
@@ -8673,7 +8980,7 @@
           <p:nvPr/>
         </p:nvPicPr>
         <p:blipFill>
-          <a:blip r:embed="rId2">
+          <a:blip r:embed="rId3">
             <a:extLst>
               <a:ext uri="{28A0092B-C50C-407E-A947-70E740481C1C}">
                 <a14:useLocalDpi xmlns:a14="http://schemas.microsoft.com/office/drawing/2010/main" val="0"/>
@@ -15173,7 +15480,6 @@
               <a:rPr lang="en-GB" sz="1700" dirty="0" smtClean="0"/>
               <a:t> </a:t>
             </a:r>
-            <a:endParaRPr lang="en-GB" sz="1700" dirty="0" smtClean="0"/>
           </a:p>
         </p:txBody>
       </p:sp>
@@ -15332,15 +15638,7 @@
           <a:p>
             <a:r>
               <a:rPr lang="en-GB" dirty="0" smtClean="0"/>
-              <a:t>Guide energy stock exchange mechanism that enables a timely </a:t>
-            </a:r>
-            <a:r>
-              <a:rPr lang="en-GB" dirty="0" smtClean="0"/>
-              <a:t>provision </a:t>
-            </a:r>
-            <a:r>
-              <a:rPr lang="en-GB" dirty="0" smtClean="0"/>
-              <a:t>of energy from consumers and producers located in a given region (e.g., the same city) </a:t>
+              <a:t>Guide energy stock exchange mechanism that enables a timely provision of energy from consumers and producers located in a given region (e.g., the same city) </a:t>
             </a:r>
           </a:p>
           <a:p>
@@ -27842,7 +28140,7 @@
   <a:extraClrSchemeLst/>
   <a:extLst>
     <a:ext uri="{05A4C25C-085E-4340-85A3-A5531E510DB2}">
-      <thm15:themeFamily xmlns:thm15="http://schemas.microsoft.com/office/thememl/2012/main" xmlns="" name="Dividend" id="{9697A71B-4AB7-4A1A-BD5B-BB2D22835B57}" vid="{C21699FF-00E4-43C8-BBCC-D7E5536C3717}"/>
+      <thm15:themeFamily xmlns="" xmlns:thm15="http://schemas.microsoft.com/office/thememl/2012/main" name="Dividend" id="{9697A71B-4AB7-4A1A-BD5B-BB2D22835B57}" vid="{C21699FF-00E4-43C8-BBCC-D7E5536C3717}"/>
     </a:ext>
   </a:extLst>
 </a:theme>

</xml_diff>